<commit_message>
Prática da aula 03
</commit_message>
<xml_diff>
--- a/Aula 03 - Modelagem Física - DDL, DML e DQL/Banco de Dados.pptx
+++ b/Aula 03 - Modelagem Física - DDL, DML e DQL/Banco de Dados.pptx
@@ -55,7 +55,8 @@
     <p:sldId id="305" r:id="rId49"/>
     <p:sldId id="306" r:id="rId50"/>
     <p:sldId id="307" r:id="rId51"/>
-    <p:sldId id="308" r:id="rId52"/>
+    <p:sldId id="309" r:id="rId52"/>
+    <p:sldId id="308" r:id="rId53"/>
   </p:sldIdLst>
   <p:sldSz cx="12192000" cy="6858000"/>
   <p:notesSz cx="6858000" cy="9144000"/>
@@ -15145,6 +15146,128 @@
       </p:grpSpPr>
       <p:sp>
         <p:nvSpPr>
+          <p:cNvPr id="2" name="Título 1">
+            <a:extLst>
+              <a:ext uri="{FF2B5EF4-FFF2-40B4-BE49-F238E27FC236}">
+                <a16:creationId xmlns:a16="http://schemas.microsoft.com/office/drawing/2014/main" id="{4759B33F-3D92-66D5-F131-B9D87FE48575}"/>
+              </a:ext>
+            </a:extLst>
+          </p:cNvPr>
+          <p:cNvSpPr>
+            <a:spLocks noGrp="1"/>
+          </p:cNvSpPr>
+          <p:nvPr>
+            <p:ph type="title"/>
+          </p:nvPr>
+        </p:nvSpPr>
+        <p:spPr/>
+        <p:txBody>
+          <a:bodyPr/>
+          <a:lstStyle/>
+          <a:p>
+            <a:r>
+              <a:rPr lang="pt-BR" dirty="0"/>
+              <a:t>CRUD</a:t>
+            </a:r>
+          </a:p>
+        </p:txBody>
+      </p:sp>
+      <p:sp>
+        <p:nvSpPr>
+          <p:cNvPr id="3" name="Espaço Reservado para Conteúdo 2">
+            <a:extLst>
+              <a:ext uri="{FF2B5EF4-FFF2-40B4-BE49-F238E27FC236}">
+                <a16:creationId xmlns:a16="http://schemas.microsoft.com/office/drawing/2014/main" id="{4FDAE9BD-6FB2-6C40-BE0F-AE54CFADA331}"/>
+              </a:ext>
+            </a:extLst>
+          </p:cNvPr>
+          <p:cNvSpPr>
+            <a:spLocks noGrp="1"/>
+          </p:cNvSpPr>
+          <p:nvPr>
+            <p:ph idx="1"/>
+          </p:nvPr>
+        </p:nvSpPr>
+        <p:spPr/>
+        <p:txBody>
+          <a:bodyPr/>
+          <a:lstStyle/>
+          <a:p>
+            <a:r>
+              <a:rPr lang="pt-BR" dirty="0"/>
+              <a:t>CREATE: Criar registros. Em SQL é o comando </a:t>
+            </a:r>
+            <a:r>
+              <a:rPr lang="pt-BR" b="1" dirty="0"/>
+              <a:t>INSERT.</a:t>
+            </a:r>
+          </a:p>
+          <a:p>
+            <a:r>
+              <a:rPr lang="pt-BR" dirty="0"/>
+              <a:t>READ: Ler os registros. Em SQL é o comando </a:t>
+            </a:r>
+            <a:r>
+              <a:rPr lang="pt-BR" b="1" dirty="0"/>
+              <a:t>SELECT.</a:t>
+            </a:r>
+            <a:endParaRPr lang="pt-BR" dirty="0"/>
+          </a:p>
+          <a:p>
+            <a:r>
+              <a:rPr lang="pt-BR" dirty="0"/>
+              <a:t>UPDATE: Atualizar os registros. Em SQL é o comando </a:t>
+            </a:r>
+            <a:r>
+              <a:rPr lang="pt-BR" b="1" dirty="0"/>
+              <a:t>UPDATE.</a:t>
+            </a:r>
+          </a:p>
+          <a:p>
+            <a:r>
+              <a:rPr lang="pt-BR" dirty="0"/>
+              <a:t>DELETE: Remover os registros. Em SQL é o comando </a:t>
+            </a:r>
+            <a:r>
+              <a:rPr lang="pt-BR" b="1" dirty="0"/>
+              <a:t>DELETE.</a:t>
+            </a:r>
+            <a:endParaRPr lang="pt-BR" dirty="0"/>
+          </a:p>
+        </p:txBody>
+      </p:sp>
+    </p:spTree>
+    <p:extLst>
+      <p:ext uri="{BB962C8B-B14F-4D97-AF65-F5344CB8AC3E}">
+        <p14:creationId xmlns:p14="http://schemas.microsoft.com/office/powerpoint/2010/main" val="3585094776"/>
+      </p:ext>
+    </p:extLst>
+  </p:cSld>
+  <p:clrMapOvr>
+    <a:masterClrMapping/>
+  </p:clrMapOvr>
+</p:sld>
+</file>
+
+<file path=ppt/slides/slide52.xml><?xml version="1.0" encoding="utf-8"?>
+<p:sld xmlns:a="http://schemas.openxmlformats.org/drawingml/2006/main" xmlns:r="http://schemas.openxmlformats.org/officeDocument/2006/relationships" xmlns:p="http://schemas.openxmlformats.org/presentationml/2006/main">
+  <p:cSld>
+    <p:spTree>
+      <p:nvGrpSpPr>
+        <p:cNvPr id="1" name=""/>
+        <p:cNvGrpSpPr/>
+        <p:nvPr/>
+      </p:nvGrpSpPr>
+      <p:grpSpPr>
+        <a:xfrm>
+          <a:off x="0" y="0"/>
+          <a:ext cx="0" cy="0"/>
+          <a:chOff x="0" y="0"/>
+          <a:chExt cx="0" cy="0"/>
+        </a:xfrm>
+      </p:grpSpPr>
+      <p:sp>
+        <p:nvSpPr>
           <p:cNvPr id="4" name="Título 3">
             <a:extLst>
               <a:ext uri="{FF2B5EF4-FFF2-40B4-BE49-F238E27FC236}">

</xml_diff>